<commit_message>
Chap05: All ready for pictures, picture coming from articles done
</commit_message>
<xml_diff>
--- a/05-CrDyn/Articles/PRBCrpump/Figure2.pptx
+++ b/05-CrDyn/Articles/PRBCrpump/Figure2.pptx
@@ -192,7 +192,7 @@
           <a:p>
             <a:fld id="{846E01DE-34E9-49ED-964F-82AFB8FEED8D}" type="datetimeFigureOut">
               <a:rPr lang="en-US" smtClean="0"/>
-              <a:t>7/13/2016</a:t>
+              <a:t>6/22/2017</a:t>
             </a:fld>
             <a:endParaRPr lang="en-US"/>
           </a:p>
@@ -725,7 +725,7 @@
           <a:p>
             <a:fld id="{E8FDFF63-9793-40E2-8DBC-13016F069603}" type="datetimeFigureOut">
               <a:rPr lang="en-US" smtClean="0"/>
-              <a:t>7/13/2016</a:t>
+              <a:t>6/22/2017</a:t>
             </a:fld>
             <a:endParaRPr lang="en-US"/>
           </a:p>
@@ -895,7 +895,7 @@
           <a:p>
             <a:fld id="{E8FDFF63-9793-40E2-8DBC-13016F069603}" type="datetimeFigureOut">
               <a:rPr lang="en-US" smtClean="0"/>
-              <a:t>7/13/2016</a:t>
+              <a:t>6/22/2017</a:t>
             </a:fld>
             <a:endParaRPr lang="en-US"/>
           </a:p>
@@ -1075,7 +1075,7 @@
           <a:p>
             <a:fld id="{E8FDFF63-9793-40E2-8DBC-13016F069603}" type="datetimeFigureOut">
               <a:rPr lang="en-US" smtClean="0"/>
-              <a:t>7/13/2016</a:t>
+              <a:t>6/22/2017</a:t>
             </a:fld>
             <a:endParaRPr lang="en-US"/>
           </a:p>
@@ -1245,7 +1245,7 @@
           <a:p>
             <a:fld id="{E8FDFF63-9793-40E2-8DBC-13016F069603}" type="datetimeFigureOut">
               <a:rPr lang="en-US" smtClean="0"/>
-              <a:t>7/13/2016</a:t>
+              <a:t>6/22/2017</a:t>
             </a:fld>
             <a:endParaRPr lang="en-US"/>
           </a:p>
@@ -1491,7 +1491,7 @@
           <a:p>
             <a:fld id="{E8FDFF63-9793-40E2-8DBC-13016F069603}" type="datetimeFigureOut">
               <a:rPr lang="en-US" smtClean="0"/>
-              <a:t>7/13/2016</a:t>
+              <a:t>6/22/2017</a:t>
             </a:fld>
             <a:endParaRPr lang="en-US"/>
           </a:p>
@@ -1779,7 +1779,7 @@
           <a:p>
             <a:fld id="{E8FDFF63-9793-40E2-8DBC-13016F069603}" type="datetimeFigureOut">
               <a:rPr lang="en-US" smtClean="0"/>
-              <a:t>7/13/2016</a:t>
+              <a:t>6/22/2017</a:t>
             </a:fld>
             <a:endParaRPr lang="en-US"/>
           </a:p>
@@ -2201,7 +2201,7 @@
           <a:p>
             <a:fld id="{E8FDFF63-9793-40E2-8DBC-13016F069603}" type="datetimeFigureOut">
               <a:rPr lang="en-US" smtClean="0"/>
-              <a:t>7/13/2016</a:t>
+              <a:t>6/22/2017</a:t>
             </a:fld>
             <a:endParaRPr lang="en-US"/>
           </a:p>
@@ -2319,7 +2319,7 @@
           <a:p>
             <a:fld id="{E8FDFF63-9793-40E2-8DBC-13016F069603}" type="datetimeFigureOut">
               <a:rPr lang="en-US" smtClean="0"/>
-              <a:t>7/13/2016</a:t>
+              <a:t>6/22/2017</a:t>
             </a:fld>
             <a:endParaRPr lang="en-US"/>
           </a:p>
@@ -2414,7 +2414,7 @@
           <a:p>
             <a:fld id="{E8FDFF63-9793-40E2-8DBC-13016F069603}" type="datetimeFigureOut">
               <a:rPr lang="en-US" smtClean="0"/>
-              <a:t>7/13/2016</a:t>
+              <a:t>6/22/2017</a:t>
             </a:fld>
             <a:endParaRPr lang="en-US"/>
           </a:p>
@@ -2691,7 +2691,7 @@
           <a:p>
             <a:fld id="{E8FDFF63-9793-40E2-8DBC-13016F069603}" type="datetimeFigureOut">
               <a:rPr lang="en-US" smtClean="0"/>
-              <a:t>7/13/2016</a:t>
+              <a:t>6/22/2017</a:t>
             </a:fld>
             <a:endParaRPr lang="en-US"/>
           </a:p>
@@ -2944,7 +2944,7 @@
           <a:p>
             <a:fld id="{E8FDFF63-9793-40E2-8DBC-13016F069603}" type="datetimeFigureOut">
               <a:rPr lang="en-US" smtClean="0"/>
-              <a:t>7/13/2016</a:t>
+              <a:t>6/22/2017</a:t>
             </a:fld>
             <a:endParaRPr lang="en-US"/>
           </a:p>
@@ -3157,7 +3157,7 @@
           <a:p>
             <a:fld id="{E8FDFF63-9793-40E2-8DBC-13016F069603}" type="datetimeFigureOut">
               <a:rPr lang="en-US" smtClean="0"/>
-              <a:t>7/13/2016</a:t>
+              <a:t>6/22/2017</a:t>
             </a:fld>
             <a:endParaRPr lang="en-US"/>
           </a:p>
@@ -3534,7 +3534,7 @@
       </p:grpSpPr>
       <p:pic>
         <p:nvPicPr>
-          <p:cNvPr id="1029" name="Picture 5"/>
+          <p:cNvPr id="1028" name="Picture 4"/>
           <p:cNvPicPr>
             <a:picLocks noChangeAspect="1" noChangeArrowheads="1"/>
           </p:cNvPicPr>
@@ -3542,60 +3542,6 @@
         </p:nvPicPr>
         <p:blipFill>
           <a:blip r:embed="rId3" cstate="print">
-            <a:extLst>
-              <a:ext uri="{28A0092B-C50C-407E-A947-70E740481C1C}">
-                <a14:useLocalDpi xmlns:a14="http://schemas.microsoft.com/office/drawing/2010/main" val="0"/>
-              </a:ext>
-            </a:extLst>
-          </a:blip>
-          <a:srcRect/>
-          <a:stretch>
-            <a:fillRect/>
-          </a:stretch>
-        </p:blipFill>
-        <p:spPr bwMode="auto">
-          <a:xfrm>
-            <a:off x="4293096" y="107504"/>
-            <a:ext cx="2536775" cy="2593766"/>
-          </a:xfrm>
-          <a:prstGeom prst="rect">
-            <a:avLst/>
-          </a:prstGeom>
-          <a:noFill/>
-          <a:ln>
-            <a:noFill/>
-          </a:ln>
-          <a:extLst>
-            <a:ext uri="{909E8E84-426E-40DD-AFC4-6F175D3DCCD1}">
-              <a14:hiddenFill xmlns:a14="http://schemas.microsoft.com/office/drawing/2010/main">
-                <a:solidFill>
-                  <a:schemeClr val="accent1"/>
-                </a:solidFill>
-              </a14:hiddenFill>
-            </a:ext>
-            <a:ext uri="{91240B29-F687-4F45-9708-019B960494DF}">
-              <a14:hiddenLine xmlns:a14="http://schemas.microsoft.com/office/drawing/2010/main" w="9525">
-                <a:solidFill>
-                  <a:schemeClr val="tx1"/>
-                </a:solidFill>
-                <a:miter lim="800000"/>
-                <a:headEnd/>
-                <a:tailEnd/>
-              </a14:hiddenLine>
-            </a:ext>
-          </a:extLst>
-        </p:spPr>
-      </p:pic>
-      <p:pic>
-        <p:nvPicPr>
-          <p:cNvPr id="1028" name="Picture 4"/>
-          <p:cNvPicPr>
-            <a:picLocks noChangeAspect="1" noChangeArrowheads="1"/>
-          </p:cNvPicPr>
-          <p:nvPr/>
-        </p:nvPicPr>
-        <p:blipFill>
-          <a:blip r:embed="rId4" cstate="print">
             <a:extLst>
               <a:ext uri="{28A0092B-C50C-407E-A947-70E740481C1C}">
                 <a14:useLocalDpi xmlns:a14="http://schemas.microsoft.com/office/drawing/2010/main" val="0"/>
@@ -3640,103 +3586,15 @@
           </a:extLst>
         </p:spPr>
       </p:pic>
-      <p:pic>
-        <p:nvPicPr>
-          <p:cNvPr id="1027" name="Picture 3"/>
-          <p:cNvPicPr>
-            <a:picLocks noChangeAspect="1" noChangeArrowheads="1"/>
-          </p:cNvPicPr>
-          <p:nvPr/>
-        </p:nvPicPr>
-        <p:blipFill rotWithShape="1">
-          <a:blip r:embed="rId5" cstate="print">
-            <a:extLst>
-              <a:ext uri="{28A0092B-C50C-407E-A947-70E740481C1C}">
-                <a14:useLocalDpi xmlns:a14="http://schemas.microsoft.com/office/drawing/2010/main" val="0"/>
-              </a:ext>
-            </a:extLst>
-          </a:blip>
-          <a:srcRect b="18139"/>
-          <a:stretch/>
-        </p:blipFill>
-        <p:spPr bwMode="auto">
-          <a:xfrm>
-            <a:off x="4271152" y="2611785"/>
-            <a:ext cx="2562018" cy="2036415"/>
-          </a:xfrm>
-          <a:prstGeom prst="rect">
-            <a:avLst/>
-          </a:prstGeom>
-          <a:noFill/>
-          <a:ln>
-            <a:noFill/>
-          </a:ln>
-          <a:extLst>
-            <a:ext uri="{909E8E84-426E-40DD-AFC4-6F175D3DCCD1}">
-              <a14:hiddenFill xmlns:a14="http://schemas.microsoft.com/office/drawing/2010/main">
-                <a:solidFill>
-                  <a:schemeClr val="accent1"/>
-                </a:solidFill>
-              </a14:hiddenFill>
-            </a:ext>
-            <a:ext uri="{91240B29-F687-4F45-9708-019B960494DF}">
-              <a14:hiddenLine xmlns:a14="http://schemas.microsoft.com/office/drawing/2010/main" w="9525">
-                <a:solidFill>
-                  <a:schemeClr val="tx1"/>
-                </a:solidFill>
-                <a:miter lim="800000"/>
-                <a:headEnd/>
-                <a:tailEnd/>
-              </a14:hiddenLine>
-            </a:ext>
-          </a:extLst>
-        </p:spPr>
-      </p:pic>
-      <p:sp>
-        <p:nvSpPr>
-          <p:cNvPr id="79" name="ZoneTexte 78"/>
+      <p:sp>
+        <p:nvSpPr>
+          <p:cNvPr id="16" name="ZoneTexte 15"/>
           <p:cNvSpPr txBox="1"/>
           <p:nvPr/>
         </p:nvSpPr>
         <p:spPr>
           <a:xfrm>
-            <a:off x="6093296" y="170220"/>
-            <a:ext cx="453970" cy="369332"/>
-          </a:xfrm>
-          <a:prstGeom prst="rect">
-            <a:avLst/>
-          </a:prstGeom>
-          <a:noFill/>
-        </p:spPr>
-        <p:txBody>
-          <a:bodyPr wrap="none" rtlCol="0">
-            <a:spAutoFit/>
-          </a:bodyPr>
-          <a:lstStyle/>
-          <a:p>
-            <a:r>
-              <a:rPr lang="fr-FR" dirty="0" smtClean="0">
-                <a:latin typeface="Times New Roman" panose="02020603050405020304" pitchFamily="18" charset="0"/>
-                <a:cs typeface="Times New Roman" panose="02020603050405020304" pitchFamily="18" charset="0"/>
-              </a:rPr>
-              <a:t>(b)</a:t>
-            </a:r>
-            <a:endParaRPr lang="en-US" dirty="0">
-              <a:latin typeface="Times New Roman" panose="02020603050405020304" pitchFamily="18" charset="0"/>
-              <a:cs typeface="Times New Roman" panose="02020603050405020304" pitchFamily="18" charset="0"/>
-            </a:endParaRPr>
-          </a:p>
-        </p:txBody>
-      </p:sp>
-      <p:sp>
-        <p:nvSpPr>
-          <p:cNvPr id="10" name="ZoneTexte 9"/>
-          <p:cNvSpPr txBox="1"/>
-          <p:nvPr/>
-        </p:nvSpPr>
-        <p:spPr>
-          <a:xfrm>
-            <a:off x="6093296" y="2690500"/>
+            <a:off x="6093296" y="4716016"/>
             <a:ext cx="441146" cy="369332"/>
           </a:xfrm>
           <a:prstGeom prst="rect">
@@ -3756,42 +3614,6 @@
                 <a:cs typeface="Times New Roman" panose="02020603050405020304" pitchFamily="18" charset="0"/>
               </a:rPr>
               <a:t>(c)</a:t>
-            </a:r>
-            <a:endParaRPr lang="en-US" dirty="0">
-              <a:latin typeface="Times New Roman" panose="02020603050405020304" pitchFamily="18" charset="0"/>
-              <a:cs typeface="Times New Roman" panose="02020603050405020304" pitchFamily="18" charset="0"/>
-            </a:endParaRPr>
-          </a:p>
-        </p:txBody>
-      </p:sp>
-      <p:sp>
-        <p:nvSpPr>
-          <p:cNvPr id="16" name="ZoneTexte 15"/>
-          <p:cNvSpPr txBox="1"/>
-          <p:nvPr/>
-        </p:nvSpPr>
-        <p:spPr>
-          <a:xfrm>
-            <a:off x="6093296" y="4716016"/>
-            <a:ext cx="453970" cy="369332"/>
-          </a:xfrm>
-          <a:prstGeom prst="rect">
-            <a:avLst/>
-          </a:prstGeom>
-          <a:noFill/>
-        </p:spPr>
-        <p:txBody>
-          <a:bodyPr wrap="none" rtlCol="0">
-            <a:spAutoFit/>
-          </a:bodyPr>
-          <a:lstStyle/>
-          <a:p>
-            <a:r>
-              <a:rPr lang="fr-FR" dirty="0" smtClean="0">
-                <a:latin typeface="Times New Roman" panose="02020603050405020304" pitchFamily="18" charset="0"/>
-                <a:cs typeface="Times New Roman" panose="02020603050405020304" pitchFamily="18" charset="0"/>
-              </a:rPr>
-              <a:t>(d)</a:t>
             </a:r>
             <a:endParaRPr lang="en-US" dirty="0">
               <a:latin typeface="Times New Roman" panose="02020603050405020304" pitchFamily="18" charset="0"/>
@@ -3809,7 +3631,7 @@
           <p:nvPr/>
         </p:nvPicPr>
         <p:blipFill rotWithShape="1">
-          <a:blip r:embed="rId6" cstate="print">
+          <a:blip r:embed="rId4" cstate="print">
             <a:extLst>
               <a:ext uri="{28A0092B-C50C-407E-A947-70E740481C1C}">
                 <a14:useLocalDpi xmlns:a14="http://schemas.microsoft.com/office/drawing/2010/main" val="0"/>

</xml_diff>